<commit_message>
changed architecture files to be consistent with new staging setup
</commit_message>
<xml_diff>
--- a/architecture/architecture_stages.pptx
+++ b/architecture/architecture_stages.pptx
@@ -104,6 +104,22 @@
       </a:defRPr>
     </a:lvl9pPr>
   </p:defaultTextStyle>
+  <p:extLst>
+    <p:ext uri="{EFAFB233-063F-42B5-8137-9DF3F51BA10A}">
+      <p15:sldGuideLst xmlns:p15="http://schemas.microsoft.com/office/powerpoint/2012/main">
+        <p15:guide id="1" orient="horz" pos="2160">
+          <p15:clr>
+            <a:srgbClr val="A4A3A4"/>
+          </p15:clr>
+        </p15:guide>
+        <p15:guide id="2" pos="2880">
+          <p15:clr>
+            <a:srgbClr val="A4A3A4"/>
+          </p15:clr>
+        </p15:guide>
+      </p15:sldGuideLst>
+    </p:ext>
+  </p:extLst>
 </p:presentation>
 </file>
 
@@ -3254,11 +3270,7 @@
             </a:r>
             <a:r>
               <a:rPr lang="de-DE" dirty="0" smtClean="0"/>
-              <a:t>: Master</a:t>
-            </a:r>
-            <a:r>
-              <a:rPr lang="de-DE" dirty="0" smtClean="0"/>
-              <a:t>-</a:t>
+              <a:t>: Master-</a:t>
             </a:r>
             <a:r>
               <a:rPr lang="de-DE" dirty="0" err="1" smtClean="0"/>
@@ -3309,11 +3321,7 @@
             </a:r>
             <a:r>
               <a:rPr lang="de-DE" dirty="0" smtClean="0"/>
-              <a:t>: Developer</a:t>
-            </a:r>
-            <a:r>
-              <a:rPr lang="de-DE" dirty="0" smtClean="0"/>
-              <a:t>-</a:t>
+              <a:t>: Developer-</a:t>
             </a:r>
             <a:r>
               <a:rPr lang="de-DE" dirty="0" err="1" smtClean="0"/>
@@ -3348,23 +3356,14 @@
             <a:pPr algn="ctr"/>
             <a:r>
               <a:rPr lang="en-GB" b="1" dirty="0" smtClean="0"/>
-              <a:t>Local </a:t>
-            </a:r>
-            <a:r>
-              <a:rPr lang="en-GB" b="1" dirty="0" smtClean="0"/>
-              <a:t>stage</a:t>
-            </a:r>
-            <a:endParaRPr lang="en-GB" b="1" dirty="0" smtClean="0"/>
+              <a:t>Local stage</a:t>
+            </a:r>
           </a:p>
           <a:p>
             <a:pPr algn="ctr"/>
             <a:r>
               <a:rPr lang="en-GB" dirty="0" smtClean="0"/>
-              <a:t>Git: Feature</a:t>
-            </a:r>
-            <a:r>
-              <a:rPr lang="en-GB" dirty="0" smtClean="0"/>
-              <a:t>-branch</a:t>
+              <a:t>Git: Feature-branch</a:t>
             </a:r>
             <a:endParaRPr lang="en-GB" dirty="0"/>
           </a:p>
@@ -4401,7 +4400,15 @@
             </a:r>
             <a:r>
               <a:rPr lang="de-DE" sz="1300" dirty="0" smtClean="0"/>
-              <a:t>)   </a:t>
+              <a:t>/ .</a:t>
+            </a:r>
+            <a:r>
+              <a:rPr lang="de-DE" sz="1300" dirty="0" err="1" smtClean="0"/>
+              <a:t>org</a:t>
+            </a:r>
+            <a:r>
+              <a:rPr lang="de-DE" sz="1300" dirty="0" smtClean="0"/>
+              <a:t>)</a:t>
             </a:r>
             <a:endParaRPr lang="de-DE" sz="1300" dirty="0"/>
           </a:p>
@@ -4478,11 +4485,31 @@
             </a:r>
             <a:r>
               <a:rPr lang="hr-HR" sz="1300" dirty="0" smtClean="0"/>
-              <a:t>18.216.129.153 (</a:t>
+              <a:t>18.216.129.153 </a:t>
+            </a:r>
+            <a:r>
+              <a:rPr lang="hr-HR" sz="1300" dirty="0" smtClean="0"/>
+              <a:t>(</a:t>
+            </a:r>
+            <a:r>
+              <a:rPr lang="hr-HR" sz="1300" dirty="0" err="1" smtClean="0"/>
+              <a:t>staging</a:t>
+            </a:r>
+            <a:r>
+              <a:rPr lang="hr-HR" sz="1300" dirty="0" smtClean="0"/>
+              <a:t>.</a:t>
             </a:r>
             <a:r>
               <a:rPr lang="de-DE" sz="1300" dirty="0" err="1" smtClean="0"/>
-              <a:t>pretrendr.org</a:t>
+              <a:t>pretrendr.com</a:t>
+            </a:r>
+            <a:r>
+              <a:rPr lang="de-DE" sz="1300" dirty="0" smtClean="0"/>
+              <a:t>/ </a:t>
+            </a:r>
+            <a:r>
+              <a:rPr lang="de-DE" sz="1300" dirty="0" err="1" smtClean="0"/>
+              <a:t>org</a:t>
             </a:r>
             <a:r>
               <a:rPr lang="hr-HR" sz="1300" dirty="0" smtClean="0"/>

</xml_diff>

<commit_message>
set up backend with circleci
</commit_message>
<xml_diff>
--- a/architecture/architecture_stages.pptx
+++ b/architecture/architecture_stages.pptx
@@ -106,7 +106,7 @@
   </p:defaultTextStyle>
   <p:extLst>
     <p:ext uri="{EFAFB233-063F-42B5-8137-9DF3F51BA10A}">
-      <p15:sldGuideLst xmlns="" xmlns:p15="http://schemas.microsoft.com/office/powerpoint/2012/main">
+      <p15:sldGuideLst xmlns:p15="http://schemas.microsoft.com/office/powerpoint/2012/main" xmlns="">
         <p15:guide id="1" orient="horz" pos="2160">
           <p15:clr>
             <a:srgbClr val="A4A3A4"/>
@@ -304,7 +304,7 @@
           <a:p>
             <a:fld id="{83999069-353B-364A-B0F0-04CB99052FAE}" type="datetimeFigureOut">
               <a:rPr lang="de-DE" smtClean="0"/>
-              <a:t>16.11.17</a:t>
+              <a:t>23.11.17</a:t>
             </a:fld>
             <a:endParaRPr lang="de-DE"/>
           </a:p>
@@ -474,7 +474,7 @@
           <a:p>
             <a:fld id="{83999069-353B-364A-B0F0-04CB99052FAE}" type="datetimeFigureOut">
               <a:rPr lang="de-DE" smtClean="0"/>
-              <a:t>16.11.17</a:t>
+              <a:t>23.11.17</a:t>
             </a:fld>
             <a:endParaRPr lang="de-DE"/>
           </a:p>
@@ -654,7 +654,7 @@
           <a:p>
             <a:fld id="{83999069-353B-364A-B0F0-04CB99052FAE}" type="datetimeFigureOut">
               <a:rPr lang="de-DE" smtClean="0"/>
-              <a:t>16.11.17</a:t>
+              <a:t>23.11.17</a:t>
             </a:fld>
             <a:endParaRPr lang="de-DE"/>
           </a:p>
@@ -824,7 +824,7 @@
           <a:p>
             <a:fld id="{83999069-353B-364A-B0F0-04CB99052FAE}" type="datetimeFigureOut">
               <a:rPr lang="de-DE" smtClean="0"/>
-              <a:t>16.11.17</a:t>
+              <a:t>23.11.17</a:t>
             </a:fld>
             <a:endParaRPr lang="de-DE"/>
           </a:p>
@@ -1070,7 +1070,7 @@
           <a:p>
             <a:fld id="{83999069-353B-364A-B0F0-04CB99052FAE}" type="datetimeFigureOut">
               <a:rPr lang="de-DE" smtClean="0"/>
-              <a:t>16.11.17</a:t>
+              <a:t>23.11.17</a:t>
             </a:fld>
             <a:endParaRPr lang="de-DE"/>
           </a:p>
@@ -1358,7 +1358,7 @@
           <a:p>
             <a:fld id="{83999069-353B-364A-B0F0-04CB99052FAE}" type="datetimeFigureOut">
               <a:rPr lang="de-DE" smtClean="0"/>
-              <a:t>16.11.17</a:t>
+              <a:t>23.11.17</a:t>
             </a:fld>
             <a:endParaRPr lang="de-DE"/>
           </a:p>
@@ -1780,7 +1780,7 @@
           <a:p>
             <a:fld id="{83999069-353B-364A-B0F0-04CB99052FAE}" type="datetimeFigureOut">
               <a:rPr lang="de-DE" smtClean="0"/>
-              <a:t>16.11.17</a:t>
+              <a:t>23.11.17</a:t>
             </a:fld>
             <a:endParaRPr lang="de-DE"/>
           </a:p>
@@ -1898,7 +1898,7 @@
           <a:p>
             <a:fld id="{83999069-353B-364A-B0F0-04CB99052FAE}" type="datetimeFigureOut">
               <a:rPr lang="de-DE" smtClean="0"/>
-              <a:t>16.11.17</a:t>
+              <a:t>23.11.17</a:t>
             </a:fld>
             <a:endParaRPr lang="de-DE"/>
           </a:p>
@@ -1993,7 +1993,7 @@
           <a:p>
             <a:fld id="{83999069-353B-364A-B0F0-04CB99052FAE}" type="datetimeFigureOut">
               <a:rPr lang="de-DE" smtClean="0"/>
-              <a:t>16.11.17</a:t>
+              <a:t>23.11.17</a:t>
             </a:fld>
             <a:endParaRPr lang="de-DE"/>
           </a:p>
@@ -2270,7 +2270,7 @@
           <a:p>
             <a:fld id="{83999069-353B-364A-B0F0-04CB99052FAE}" type="datetimeFigureOut">
               <a:rPr lang="de-DE" smtClean="0"/>
-              <a:t>16.11.17</a:t>
+              <a:t>23.11.17</a:t>
             </a:fld>
             <a:endParaRPr lang="de-DE"/>
           </a:p>
@@ -2523,7 +2523,7 @@
           <a:p>
             <a:fld id="{83999069-353B-364A-B0F0-04CB99052FAE}" type="datetimeFigureOut">
               <a:rPr lang="de-DE" smtClean="0"/>
-              <a:t>16.11.17</a:t>
+              <a:t>23.11.17</a:t>
             </a:fld>
             <a:endParaRPr lang="de-DE"/>
           </a:p>
@@ -2736,7 +2736,7 @@
           <a:p>
             <a:fld id="{83999069-353B-364A-B0F0-04CB99052FAE}" type="datetimeFigureOut">
               <a:rPr lang="de-DE" smtClean="0"/>
-              <a:t>16.11.17</a:t>
+              <a:t>23.11.17</a:t>
             </a:fld>
             <a:endParaRPr lang="de-DE"/>
           </a:p>
@@ -4727,7 +4727,11 @@
             </a:r>
             <a:r>
               <a:rPr lang="hr-HR" sz="1200" dirty="0" smtClean="0"/>
-              <a:t>staging.pretrendr.com</a:t>
+              <a:t>test</a:t>
+            </a:r>
+            <a:r>
+              <a:rPr lang="hr-HR" sz="1200" dirty="0" smtClean="0"/>
+              <a:t>.pretrendr.com</a:t>
             </a:r>
             <a:r>
               <a:rPr lang="de-DE" sz="1200" dirty="0" smtClean="0"/>

</xml_diff>

<commit_message>
readme: changed staging section
</commit_message>
<xml_diff>
--- a/architecture/architecture_stages.pptx
+++ b/architecture/architecture_stages.pptx
@@ -106,7 +106,7 @@
   </p:defaultTextStyle>
   <p:extLst>
     <p:ext uri="{EFAFB233-063F-42B5-8137-9DF3F51BA10A}">
-      <p15:sldGuideLst xmlns:p15="http://schemas.microsoft.com/office/powerpoint/2012/main" xmlns="">
+      <p15:sldGuideLst xmlns="" xmlns:p15="http://schemas.microsoft.com/office/powerpoint/2012/main">
         <p15:guide id="1" orient="horz" pos="2160">
           <p15:clr>
             <a:srgbClr val="A4A3A4"/>
@@ -304,7 +304,7 @@
           <a:p>
             <a:fld id="{83999069-353B-364A-B0F0-04CB99052FAE}" type="datetimeFigureOut">
               <a:rPr lang="de-DE" smtClean="0"/>
-              <a:t>23.11.17</a:t>
+              <a:t>06.12.17</a:t>
             </a:fld>
             <a:endParaRPr lang="de-DE"/>
           </a:p>
@@ -474,7 +474,7 @@
           <a:p>
             <a:fld id="{83999069-353B-364A-B0F0-04CB99052FAE}" type="datetimeFigureOut">
               <a:rPr lang="de-DE" smtClean="0"/>
-              <a:t>23.11.17</a:t>
+              <a:t>06.12.17</a:t>
             </a:fld>
             <a:endParaRPr lang="de-DE"/>
           </a:p>
@@ -654,7 +654,7 @@
           <a:p>
             <a:fld id="{83999069-353B-364A-B0F0-04CB99052FAE}" type="datetimeFigureOut">
               <a:rPr lang="de-DE" smtClean="0"/>
-              <a:t>23.11.17</a:t>
+              <a:t>06.12.17</a:t>
             </a:fld>
             <a:endParaRPr lang="de-DE"/>
           </a:p>
@@ -824,7 +824,7 @@
           <a:p>
             <a:fld id="{83999069-353B-364A-B0F0-04CB99052FAE}" type="datetimeFigureOut">
               <a:rPr lang="de-DE" smtClean="0"/>
-              <a:t>23.11.17</a:t>
+              <a:t>06.12.17</a:t>
             </a:fld>
             <a:endParaRPr lang="de-DE"/>
           </a:p>
@@ -1070,7 +1070,7 @@
           <a:p>
             <a:fld id="{83999069-353B-364A-B0F0-04CB99052FAE}" type="datetimeFigureOut">
               <a:rPr lang="de-DE" smtClean="0"/>
-              <a:t>23.11.17</a:t>
+              <a:t>06.12.17</a:t>
             </a:fld>
             <a:endParaRPr lang="de-DE"/>
           </a:p>
@@ -1358,7 +1358,7 @@
           <a:p>
             <a:fld id="{83999069-353B-364A-B0F0-04CB99052FAE}" type="datetimeFigureOut">
               <a:rPr lang="de-DE" smtClean="0"/>
-              <a:t>23.11.17</a:t>
+              <a:t>06.12.17</a:t>
             </a:fld>
             <a:endParaRPr lang="de-DE"/>
           </a:p>
@@ -1780,7 +1780,7 @@
           <a:p>
             <a:fld id="{83999069-353B-364A-B0F0-04CB99052FAE}" type="datetimeFigureOut">
               <a:rPr lang="de-DE" smtClean="0"/>
-              <a:t>23.11.17</a:t>
+              <a:t>06.12.17</a:t>
             </a:fld>
             <a:endParaRPr lang="de-DE"/>
           </a:p>
@@ -1898,7 +1898,7 @@
           <a:p>
             <a:fld id="{83999069-353B-364A-B0F0-04CB99052FAE}" type="datetimeFigureOut">
               <a:rPr lang="de-DE" smtClean="0"/>
-              <a:t>23.11.17</a:t>
+              <a:t>06.12.17</a:t>
             </a:fld>
             <a:endParaRPr lang="de-DE"/>
           </a:p>
@@ -1993,7 +1993,7 @@
           <a:p>
             <a:fld id="{83999069-353B-364A-B0F0-04CB99052FAE}" type="datetimeFigureOut">
               <a:rPr lang="de-DE" smtClean="0"/>
-              <a:t>23.11.17</a:t>
+              <a:t>06.12.17</a:t>
             </a:fld>
             <a:endParaRPr lang="de-DE"/>
           </a:p>
@@ -2270,7 +2270,7 @@
           <a:p>
             <a:fld id="{83999069-353B-364A-B0F0-04CB99052FAE}" type="datetimeFigureOut">
               <a:rPr lang="de-DE" smtClean="0"/>
-              <a:t>23.11.17</a:t>
+              <a:t>06.12.17</a:t>
             </a:fld>
             <a:endParaRPr lang="de-DE"/>
           </a:p>
@@ -2523,7 +2523,7 @@
           <a:p>
             <a:fld id="{83999069-353B-364A-B0F0-04CB99052FAE}" type="datetimeFigureOut">
               <a:rPr lang="de-DE" smtClean="0"/>
-              <a:t>23.11.17</a:t>
+              <a:t>06.12.17</a:t>
             </a:fld>
             <a:endParaRPr lang="de-DE"/>
           </a:p>
@@ -2736,7 +2736,7 @@
           <a:p>
             <a:fld id="{83999069-353B-364A-B0F0-04CB99052FAE}" type="datetimeFigureOut">
               <a:rPr lang="de-DE" smtClean="0"/>
-              <a:t>23.11.17</a:t>
+              <a:t>06.12.17</a:t>
             </a:fld>
             <a:endParaRPr lang="de-DE"/>
           </a:p>
@@ -3119,8 +3119,8 @@
         </p:nvSpPr>
         <p:spPr>
           <a:xfrm>
-            <a:off x="1381543" y="139570"/>
-            <a:ext cx="6098326" cy="1898119"/>
+            <a:off x="1381543" y="27915"/>
+            <a:ext cx="6098326" cy="1744594"/>
           </a:xfrm>
           <a:prstGeom prst="rect">
             <a:avLst/>
@@ -3157,8 +3157,8 @@
         </p:nvSpPr>
         <p:spPr>
           <a:xfrm>
-            <a:off x="1381543" y="2469222"/>
-            <a:ext cx="6098326" cy="1898119"/>
+            <a:off x="1381543" y="2735524"/>
+            <a:ext cx="6098326" cy="1771387"/>
           </a:xfrm>
           <a:prstGeom prst="rect">
             <a:avLst/>
@@ -3195,7 +3195,7 @@
         </p:nvSpPr>
         <p:spPr>
           <a:xfrm>
-            <a:off x="1381543" y="4931968"/>
+            <a:off x="1381543" y="5071538"/>
             <a:ext cx="6098326" cy="1753318"/>
           </a:xfrm>
           <a:prstGeom prst="rect">
@@ -3233,7 +3233,7 @@
         </p:nvSpPr>
         <p:spPr>
           <a:xfrm>
-            <a:off x="0" y="663944"/>
+            <a:off x="0" y="552288"/>
             <a:ext cx="1381542" cy="923330"/>
           </a:xfrm>
           <a:prstGeom prst="rect">
@@ -3288,7 +3288,7 @@
         </p:nvSpPr>
         <p:spPr>
           <a:xfrm>
-            <a:off x="1" y="2903955"/>
+            <a:off x="1" y="3043525"/>
             <a:ext cx="1381541" cy="1200329"/>
           </a:xfrm>
           <a:prstGeom prst="rect">
@@ -3339,7 +3339,7 @@
         </p:nvSpPr>
         <p:spPr>
           <a:xfrm>
-            <a:off x="0" y="5521623"/>
+            <a:off x="0" y="5661193"/>
             <a:ext cx="1381543" cy="923330"/>
           </a:xfrm>
           <a:prstGeom prst="rect">
@@ -3385,7 +3385,7 @@
         </p:blipFill>
         <p:spPr>
           <a:xfrm>
-            <a:off x="7717104" y="302920"/>
+            <a:off x="7717104" y="191264"/>
             <a:ext cx="1384217" cy="1248509"/>
           </a:xfrm>
           <a:prstGeom prst="rect">
@@ -3401,7 +3401,7 @@
         </p:nvSpPr>
         <p:spPr>
           <a:xfrm>
-            <a:off x="7717104" y="1475618"/>
+            <a:off x="7717104" y="1363962"/>
             <a:ext cx="1384217" cy="646331"/>
           </a:xfrm>
           <a:prstGeom prst="rect">
@@ -3440,7 +3440,7 @@
         </p:nvSpPr>
         <p:spPr>
           <a:xfrm>
-            <a:off x="5718229" y="581631"/>
+            <a:off x="5718229" y="469975"/>
             <a:ext cx="1091802" cy="914400"/>
           </a:xfrm>
           <a:prstGeom prst="rect">
@@ -3482,7 +3482,7 @@
         </p:nvSpPr>
         <p:spPr>
           <a:xfrm>
-            <a:off x="4153062" y="581631"/>
+            <a:off x="4153062" y="469975"/>
             <a:ext cx="1091802" cy="914400"/>
           </a:xfrm>
           <a:prstGeom prst="rect">
@@ -3531,7 +3531,7 @@
         </p:nvSpPr>
         <p:spPr>
           <a:xfrm>
-            <a:off x="1603717" y="595588"/>
+            <a:off x="1603717" y="483932"/>
             <a:ext cx="1091802" cy="914400"/>
           </a:xfrm>
           <a:prstGeom prst="rect">
@@ -3576,7 +3576,7 @@
         </p:nvCxnSpPr>
         <p:spPr>
           <a:xfrm flipH="1">
-            <a:off x="5244864" y="1038831"/>
+            <a:off x="5244864" y="927175"/>
             <a:ext cx="473365" cy="0"/>
           </a:xfrm>
           <a:prstGeom prst="line">
@@ -3609,7 +3609,7 @@
         </p:nvCxnSpPr>
         <p:spPr>
           <a:xfrm flipH="1">
-            <a:off x="2695519" y="1038831"/>
+            <a:off x="2695519" y="927175"/>
             <a:ext cx="1457543" cy="13957"/>
           </a:xfrm>
           <a:prstGeom prst="line">
@@ -3639,7 +3639,7 @@
         </p:nvSpPr>
         <p:spPr>
           <a:xfrm>
-            <a:off x="1381543" y="144902"/>
+            <a:off x="1381543" y="33246"/>
             <a:ext cx="629650" cy="369332"/>
           </a:xfrm>
           <a:prstGeom prst="rect">
@@ -3669,7 +3669,7 @@
         </p:nvSpPr>
         <p:spPr>
           <a:xfrm>
-            <a:off x="1381543" y="2451973"/>
+            <a:off x="1381543" y="2842769"/>
             <a:ext cx="629650" cy="369332"/>
           </a:xfrm>
           <a:prstGeom prst="rect">
@@ -3699,7 +3699,7 @@
         </p:nvSpPr>
         <p:spPr>
           <a:xfrm>
-            <a:off x="5718229" y="3176892"/>
+            <a:off x="5718229" y="3316462"/>
             <a:ext cx="1091802" cy="914400"/>
           </a:xfrm>
           <a:prstGeom prst="rect">
@@ -3741,7 +3741,7 @@
         </p:nvSpPr>
         <p:spPr>
           <a:xfrm>
-            <a:off x="4153062" y="3176892"/>
+            <a:off x="4153062" y="3316462"/>
             <a:ext cx="1091802" cy="914400"/>
           </a:xfrm>
           <a:prstGeom prst="rect">
@@ -3794,7 +3794,7 @@
         </p:nvSpPr>
         <p:spPr>
           <a:xfrm>
-            <a:off x="1603717" y="3176892"/>
+            <a:off x="1603717" y="3316462"/>
             <a:ext cx="1091802" cy="914400"/>
           </a:xfrm>
           <a:prstGeom prst="rect">
@@ -3839,7 +3839,7 @@
         </p:nvCxnSpPr>
         <p:spPr>
           <a:xfrm flipH="1">
-            <a:off x="5244864" y="3634092"/>
+            <a:off x="5244864" y="3773662"/>
             <a:ext cx="473365" cy="0"/>
           </a:xfrm>
           <a:prstGeom prst="line">
@@ -3872,7 +3872,7 @@
         </p:nvCxnSpPr>
         <p:spPr>
           <a:xfrm flipH="1">
-            <a:off x="2695519" y="3634092"/>
+            <a:off x="2695519" y="3773662"/>
             <a:ext cx="1457543" cy="0"/>
           </a:xfrm>
           <a:prstGeom prst="line">
@@ -3902,7 +3902,7 @@
         </p:nvSpPr>
         <p:spPr>
           <a:xfrm>
-            <a:off x="5718229" y="5507666"/>
+            <a:off x="5718229" y="5647236"/>
             <a:ext cx="1091802" cy="914400"/>
           </a:xfrm>
           <a:prstGeom prst="rect">
@@ -3944,7 +3944,7 @@
         </p:nvSpPr>
         <p:spPr>
           <a:xfrm>
-            <a:off x="4153062" y="5507666"/>
+            <a:off x="4153062" y="5647236"/>
             <a:ext cx="1091802" cy="914400"/>
           </a:xfrm>
           <a:prstGeom prst="rect">
@@ -3997,7 +3997,7 @@
         </p:nvSpPr>
         <p:spPr>
           <a:xfrm>
-            <a:off x="1603717" y="5521623"/>
+            <a:off x="1603717" y="5661193"/>
             <a:ext cx="1091802" cy="914400"/>
           </a:xfrm>
           <a:prstGeom prst="rect">
@@ -4042,7 +4042,7 @@
         </p:nvCxnSpPr>
         <p:spPr>
           <a:xfrm flipH="1">
-            <a:off x="5244864" y="5964866"/>
+            <a:off x="5244864" y="6104436"/>
             <a:ext cx="473365" cy="0"/>
           </a:xfrm>
           <a:prstGeom prst="line">
@@ -4075,7 +4075,7 @@
         </p:nvCxnSpPr>
         <p:spPr>
           <a:xfrm flipH="1">
-            <a:off x="2695519" y="5964866"/>
+            <a:off x="2695519" y="6104436"/>
             <a:ext cx="1457543" cy="13957"/>
           </a:xfrm>
           <a:prstGeom prst="line">
@@ -4113,7 +4113,7 @@
         </p:blipFill>
         <p:spPr>
           <a:xfrm>
-            <a:off x="7717104" y="3921785"/>
+            <a:off x="7717104" y="4061355"/>
             <a:ext cx="1384217" cy="1248509"/>
           </a:xfrm>
           <a:prstGeom prst="rect">
@@ -4129,7 +4129,7 @@
         </p:nvSpPr>
         <p:spPr>
           <a:xfrm>
-            <a:off x="7717104" y="5138317"/>
+            <a:off x="7717104" y="5277887"/>
             <a:ext cx="1384217" cy="369332"/>
           </a:xfrm>
           <a:prstGeom prst="rect">
@@ -4162,7 +4162,7 @@
         </p:nvCxnSpPr>
         <p:spPr>
           <a:xfrm flipH="1">
-            <a:off x="6810031" y="1038831"/>
+            <a:off x="6810031" y="927175"/>
             <a:ext cx="907073" cy="0"/>
           </a:xfrm>
           <a:prstGeom prst="line">
@@ -4195,7 +4195,7 @@
         </p:nvCxnSpPr>
         <p:spPr>
           <a:xfrm flipH="1" flipV="1">
-            <a:off x="6810031" y="3634092"/>
+            <a:off x="6810031" y="3773662"/>
             <a:ext cx="907073" cy="911948"/>
           </a:xfrm>
           <a:prstGeom prst="line">
@@ -4228,7 +4228,7 @@
         </p:nvCxnSpPr>
         <p:spPr>
           <a:xfrm flipH="1">
-            <a:off x="6810031" y="4546040"/>
+            <a:off x="6810031" y="4685610"/>
             <a:ext cx="907073" cy="1418826"/>
           </a:xfrm>
           <a:prstGeom prst="line">
@@ -4261,7 +4261,7 @@
         </p:nvCxnSpPr>
         <p:spPr>
           <a:xfrm rot="16200000" flipV="1">
-            <a:off x="2716104" y="3524806"/>
+            <a:off x="2716104" y="3664376"/>
             <a:ext cx="1416374" cy="2549345"/>
           </a:xfrm>
           <a:prstGeom prst="bentConnector3">
@@ -4298,7 +4298,7 @@
         </p:nvCxnSpPr>
         <p:spPr>
           <a:xfrm rot="16200000" flipV="1">
-            <a:off x="4675661" y="3919197"/>
+            <a:off x="4675661" y="4058767"/>
             <a:ext cx="1611772" cy="1565166"/>
           </a:xfrm>
           <a:prstGeom prst="bentConnector3">
@@ -4335,8 +4335,8 @@
         </p:nvSpPr>
         <p:spPr>
           <a:xfrm>
-            <a:off x="3725979" y="291971"/>
-            <a:ext cx="1632733" cy="1648020"/>
+            <a:off x="3725979" y="180315"/>
+            <a:ext cx="1632733" cy="1466582"/>
           </a:xfrm>
           <a:prstGeom prst="rect">
             <a:avLst/>
@@ -4374,7 +4374,7 @@
         </p:nvSpPr>
         <p:spPr>
           <a:xfrm>
-            <a:off x="3725979" y="274846"/>
+            <a:off x="3725979" y="163190"/>
             <a:ext cx="3544565" cy="292388"/>
           </a:xfrm>
           <a:prstGeom prst="rect">
@@ -4408,8 +4408,8 @@
         </p:nvSpPr>
         <p:spPr>
           <a:xfrm>
-            <a:off x="3725979" y="2580812"/>
-            <a:ext cx="1632733" cy="1648083"/>
+            <a:off x="3725979" y="2870742"/>
+            <a:ext cx="1632733" cy="1497723"/>
           </a:xfrm>
           <a:prstGeom prst="rect">
             <a:avLst/>
@@ -4447,7 +4447,7 @@
         </p:nvSpPr>
         <p:spPr>
           <a:xfrm>
-            <a:off x="3725979" y="2563688"/>
+            <a:off x="3725979" y="2870742"/>
             <a:ext cx="1632733" cy="292388"/>
           </a:xfrm>
           <a:prstGeom prst="rect">
@@ -4489,7 +4489,7 @@
         </p:nvSpPr>
         <p:spPr>
           <a:xfrm>
-            <a:off x="1383219" y="4931967"/>
+            <a:off x="1383219" y="5071537"/>
             <a:ext cx="1519729" cy="369332"/>
           </a:xfrm>
           <a:prstGeom prst="rect">
@@ -4513,90 +4513,14 @@
       </p:sp>
       <p:sp>
         <p:nvSpPr>
-          <p:cNvPr id="46" name="Textfeld 45"/>
-          <p:cNvSpPr txBox="1"/>
-          <p:nvPr/>
-        </p:nvSpPr>
-        <p:spPr>
-          <a:xfrm>
-            <a:off x="3725979" y="1581292"/>
-            <a:ext cx="1518885" cy="292388"/>
-          </a:xfrm>
-          <a:prstGeom prst="rect">
-            <a:avLst/>
-          </a:prstGeom>
-          <a:noFill/>
-        </p:spPr>
-        <p:txBody>
-          <a:bodyPr wrap="square" rtlCol="0">
-            <a:spAutoFit/>
-          </a:bodyPr>
-          <a:lstStyle/>
-          <a:p>
-            <a:r>
-              <a:rPr lang="de-DE" sz="1300" dirty="0" smtClean="0"/>
-              <a:t>Jenkins </a:t>
-            </a:r>
-            <a:r>
-              <a:rPr lang="de-DE" sz="1300" dirty="0" err="1" smtClean="0"/>
-              <a:t>port</a:t>
-            </a:r>
-            <a:r>
-              <a:rPr lang="de-DE" sz="1300" dirty="0" smtClean="0"/>
-              <a:t>: 8080</a:t>
-            </a:r>
-            <a:endParaRPr lang="de-DE" sz="1300" dirty="0"/>
-          </a:p>
-        </p:txBody>
-      </p:sp>
-      <p:sp>
-        <p:nvSpPr>
-          <p:cNvPr id="48" name="Textfeld 47"/>
-          <p:cNvSpPr txBox="1"/>
-          <p:nvPr/>
-        </p:nvSpPr>
-        <p:spPr>
-          <a:xfrm>
-            <a:off x="3725979" y="2856076"/>
-            <a:ext cx="1518885" cy="292388"/>
-          </a:xfrm>
-          <a:prstGeom prst="rect">
-            <a:avLst/>
-          </a:prstGeom>
-          <a:noFill/>
-        </p:spPr>
-        <p:txBody>
-          <a:bodyPr wrap="square" rtlCol="0">
-            <a:spAutoFit/>
-          </a:bodyPr>
-          <a:lstStyle/>
-          <a:p>
-            <a:r>
-              <a:rPr lang="de-DE" sz="1300" dirty="0" smtClean="0"/>
-              <a:t>Jenkins </a:t>
-            </a:r>
-            <a:r>
-              <a:rPr lang="de-DE" sz="1300" dirty="0" err="1" smtClean="0"/>
-              <a:t>port</a:t>
-            </a:r>
-            <a:r>
-              <a:rPr lang="de-DE" sz="1300" dirty="0" smtClean="0"/>
-              <a:t>: 8080</a:t>
-            </a:r>
-            <a:endParaRPr lang="de-DE" sz="1300" dirty="0"/>
-          </a:p>
-        </p:txBody>
-      </p:sp>
-      <p:sp>
-        <p:nvSpPr>
           <p:cNvPr id="49" name="Rechteck 48"/>
           <p:cNvSpPr/>
           <p:nvPr/>
         </p:nvSpPr>
         <p:spPr>
           <a:xfrm>
-            <a:off x="5511112" y="291971"/>
-            <a:ext cx="1632733" cy="1648020"/>
+            <a:off x="5511112" y="180315"/>
+            <a:ext cx="1632733" cy="1466582"/>
           </a:xfrm>
           <a:prstGeom prst="rect">
             <a:avLst/>
@@ -4634,7 +4558,7 @@
         </p:nvSpPr>
         <p:spPr>
           <a:xfrm>
-            <a:off x="5498262" y="289243"/>
+            <a:off x="5498262" y="177587"/>
             <a:ext cx="1645584" cy="292388"/>
           </a:xfrm>
           <a:prstGeom prst="rect">
@@ -4668,8 +4592,8 @@
         </p:nvSpPr>
         <p:spPr>
           <a:xfrm>
-            <a:off x="5498262" y="2563688"/>
-            <a:ext cx="1883922" cy="1648083"/>
+            <a:off x="5498262" y="2870742"/>
+            <a:ext cx="1883922" cy="1480599"/>
           </a:xfrm>
           <a:prstGeom prst="rect">
             <a:avLst/>
@@ -4707,7 +4631,7 @@
         </p:nvSpPr>
         <p:spPr>
           <a:xfrm>
-            <a:off x="5511112" y="2580812"/>
+            <a:off x="5511112" y="2859952"/>
             <a:ext cx="1871072" cy="276999"/>
           </a:xfrm>
           <a:prstGeom prst="rect">
@@ -4727,7 +4651,7 @@
             </a:r>
             <a:r>
               <a:rPr lang="hr-HR" sz="1200" dirty="0" smtClean="0"/>
-              <a:t>test</a:t>
+              <a:t>staging</a:t>
             </a:r>
             <a:r>
               <a:rPr lang="hr-HR" sz="1200" dirty="0" smtClean="0"/>
@@ -4738,6 +4662,288 @@
               <a:t>    </a:t>
             </a:r>
             <a:endParaRPr lang="de-DE" sz="1200" dirty="0"/>
+          </a:p>
+        </p:txBody>
+      </p:sp>
+      <p:sp>
+        <p:nvSpPr>
+          <p:cNvPr id="53" name="Rechteck 52"/>
+          <p:cNvSpPr/>
+          <p:nvPr/>
+        </p:nvSpPr>
+        <p:spPr>
+          <a:xfrm>
+            <a:off x="2624087" y="2024250"/>
+            <a:ext cx="1091802" cy="363396"/>
+          </a:xfrm>
+          <a:prstGeom prst="rect">
+            <a:avLst/>
+          </a:prstGeom>
+        </p:spPr>
+        <p:style>
+          <a:lnRef idx="1">
+            <a:schemeClr val="accent3"/>
+          </a:lnRef>
+          <a:fillRef idx="2">
+            <a:schemeClr val="accent3"/>
+          </a:fillRef>
+          <a:effectRef idx="1">
+            <a:schemeClr val="accent3"/>
+          </a:effectRef>
+          <a:fontRef idx="minor">
+            <a:schemeClr val="dk1"/>
+          </a:fontRef>
+        </p:style>
+        <p:txBody>
+          <a:bodyPr rtlCol="0" anchor="ctr"/>
+          <a:lstStyle/>
+          <a:p>
+            <a:pPr algn="ctr"/>
+            <a:r>
+              <a:rPr lang="de-DE" dirty="0" err="1" smtClean="0"/>
+              <a:t>CircleCI</a:t>
+            </a:r>
+            <a:endParaRPr lang="de-DE" dirty="0"/>
+          </a:p>
+        </p:txBody>
+      </p:sp>
+      <p:cxnSp>
+        <p:nvCxnSpPr>
+          <p:cNvPr id="54" name="Gewinkelte Verbindung 53"/>
+          <p:cNvCxnSpPr>
+            <a:stCxn id="53" idx="0"/>
+            <a:endCxn id="13" idx="2"/>
+          </p:cNvCxnSpPr>
+          <p:nvPr/>
+        </p:nvCxnSpPr>
+        <p:spPr>
+          <a:xfrm rot="5400000" flipH="1" flipV="1">
+            <a:off x="4397122" y="157242"/>
+            <a:ext cx="639875" cy="3094142"/>
+          </a:xfrm>
+          <a:prstGeom prst="bentConnector3">
+            <a:avLst>
+              <a:gd name="adj1" fmla="val 26007"/>
+            </a:avLst>
+          </a:prstGeom>
+          <a:ln>
+            <a:tailEnd type="arrow"/>
+          </a:ln>
+        </p:spPr>
+        <p:style>
+          <a:lnRef idx="2">
+            <a:schemeClr val="accent1"/>
+          </a:lnRef>
+          <a:fillRef idx="0">
+            <a:schemeClr val="accent1"/>
+          </a:fillRef>
+          <a:effectRef idx="1">
+            <a:schemeClr val="accent1"/>
+          </a:effectRef>
+          <a:fontRef idx="minor">
+            <a:schemeClr val="tx1"/>
+          </a:fontRef>
+        </p:style>
+      </p:cxnSp>
+      <p:cxnSp>
+        <p:nvCxnSpPr>
+          <p:cNvPr id="58" name="Gewinkelte Verbindung 57"/>
+          <p:cNvCxnSpPr>
+            <a:stCxn id="53" idx="0"/>
+            <a:endCxn id="37" idx="2"/>
+          </p:cNvCxnSpPr>
+          <p:nvPr/>
+        </p:nvCxnSpPr>
+        <p:spPr>
+          <a:xfrm rot="5400000" flipH="1" flipV="1">
+            <a:off x="3667491" y="1149395"/>
+            <a:ext cx="377353" cy="1372358"/>
+          </a:xfrm>
+          <a:prstGeom prst="bentConnector3">
+            <a:avLst>
+              <a:gd name="adj1" fmla="val 50000"/>
+            </a:avLst>
+          </a:prstGeom>
+          <a:ln>
+            <a:tailEnd type="arrow"/>
+          </a:ln>
+        </p:spPr>
+        <p:style>
+          <a:lnRef idx="2">
+            <a:schemeClr val="accent1"/>
+          </a:lnRef>
+          <a:fillRef idx="0">
+            <a:schemeClr val="accent1"/>
+          </a:fillRef>
+          <a:effectRef idx="1">
+            <a:schemeClr val="accent1"/>
+          </a:effectRef>
+          <a:fontRef idx="minor">
+            <a:schemeClr val="tx1"/>
+          </a:fontRef>
+        </p:style>
+      </p:cxnSp>
+      <p:cxnSp>
+        <p:nvCxnSpPr>
+          <p:cNvPr id="61" name="Gewinkelte Verbindung 60"/>
+          <p:cNvCxnSpPr>
+            <a:stCxn id="53" idx="2"/>
+            <a:endCxn id="44" idx="0"/>
+          </p:cNvCxnSpPr>
+          <p:nvPr/>
+        </p:nvCxnSpPr>
+        <p:spPr>
+          <a:xfrm rot="16200000" flipH="1">
+            <a:off x="3614619" y="1943015"/>
+            <a:ext cx="483096" cy="1372358"/>
+          </a:xfrm>
+          <a:prstGeom prst="bentConnector3">
+            <a:avLst/>
+          </a:prstGeom>
+          <a:ln>
+            <a:tailEnd type="arrow"/>
+          </a:ln>
+        </p:spPr>
+        <p:style>
+          <a:lnRef idx="2">
+            <a:schemeClr val="accent1"/>
+          </a:lnRef>
+          <a:fillRef idx="0">
+            <a:schemeClr val="accent1"/>
+          </a:fillRef>
+          <a:effectRef idx="1">
+            <a:schemeClr val="accent1"/>
+          </a:effectRef>
+          <a:fontRef idx="minor">
+            <a:schemeClr val="tx1"/>
+          </a:fontRef>
+        </p:style>
+      </p:cxnSp>
+      <p:cxnSp>
+        <p:nvCxnSpPr>
+          <p:cNvPr id="63" name="Gewinkelte Verbindung 62"/>
+          <p:cNvCxnSpPr>
+            <a:stCxn id="53" idx="2"/>
+            <a:endCxn id="52" idx="0"/>
+          </p:cNvCxnSpPr>
+          <p:nvPr/>
+        </p:nvCxnSpPr>
+        <p:spPr>
+          <a:xfrm rot="16200000" flipH="1">
+            <a:off x="4572165" y="985469"/>
+            <a:ext cx="472306" cy="3276660"/>
+          </a:xfrm>
+          <a:prstGeom prst="bentConnector3">
+            <a:avLst/>
+          </a:prstGeom>
+          <a:ln>
+            <a:tailEnd type="arrow"/>
+          </a:ln>
+        </p:spPr>
+        <p:style>
+          <a:lnRef idx="2">
+            <a:schemeClr val="accent1"/>
+          </a:lnRef>
+          <a:fillRef idx="0">
+            <a:schemeClr val="accent1"/>
+          </a:fillRef>
+          <a:effectRef idx="1">
+            <a:schemeClr val="accent1"/>
+          </a:effectRef>
+          <a:fontRef idx="minor">
+            <a:schemeClr val="tx1"/>
+          </a:fontRef>
+        </p:style>
+      </p:cxnSp>
+      <p:sp>
+        <p:nvSpPr>
+          <p:cNvPr id="65" name="Textfeld 64"/>
+          <p:cNvSpPr txBox="1"/>
+          <p:nvPr/>
+        </p:nvSpPr>
+        <p:spPr>
+          <a:xfrm>
+            <a:off x="4278522" y="1769800"/>
+            <a:ext cx="1937099" cy="369332"/>
+          </a:xfrm>
+          <a:prstGeom prst="rect">
+            <a:avLst/>
+          </a:prstGeom>
+          <a:noFill/>
+        </p:spPr>
+        <p:txBody>
+          <a:bodyPr wrap="none" rtlCol="0">
+            <a:spAutoFit/>
+          </a:bodyPr>
+          <a:lstStyle/>
+          <a:p>
+            <a:r>
+              <a:rPr lang="de-DE" dirty="0" err="1" smtClean="0"/>
+              <a:t>Git</a:t>
+            </a:r>
+            <a:r>
+              <a:rPr lang="de-DE" dirty="0" smtClean="0"/>
+              <a:t> </a:t>
+            </a:r>
+            <a:r>
+              <a:rPr lang="de-DE" dirty="0" err="1" smtClean="0"/>
+              <a:t>branch</a:t>
+            </a:r>
+            <a:r>
+              <a:rPr lang="de-DE" dirty="0" smtClean="0"/>
+              <a:t>: </a:t>
+            </a:r>
+            <a:r>
+              <a:rPr lang="de-DE" dirty="0" err="1" smtClean="0"/>
+              <a:t>master</a:t>
+            </a:r>
+            <a:endParaRPr lang="de-DE" dirty="0"/>
+          </a:p>
+        </p:txBody>
+      </p:sp>
+      <p:sp>
+        <p:nvSpPr>
+          <p:cNvPr id="66" name="Textfeld 65"/>
+          <p:cNvSpPr txBox="1"/>
+          <p:nvPr/>
+        </p:nvSpPr>
+        <p:spPr>
+          <a:xfrm>
+            <a:off x="4277417" y="2243211"/>
+            <a:ext cx="2030424" cy="369332"/>
+          </a:xfrm>
+          <a:prstGeom prst="rect">
+            <a:avLst/>
+          </a:prstGeom>
+          <a:noFill/>
+        </p:spPr>
+        <p:txBody>
+          <a:bodyPr wrap="none" rtlCol="0">
+            <a:spAutoFit/>
+          </a:bodyPr>
+          <a:lstStyle/>
+          <a:p>
+            <a:r>
+              <a:rPr lang="de-DE" dirty="0" err="1" smtClean="0"/>
+              <a:t>Git</a:t>
+            </a:r>
+            <a:r>
+              <a:rPr lang="de-DE" dirty="0" smtClean="0"/>
+              <a:t> </a:t>
+            </a:r>
+            <a:r>
+              <a:rPr lang="de-DE" dirty="0" err="1" smtClean="0"/>
+              <a:t>branch</a:t>
+            </a:r>
+            <a:r>
+              <a:rPr lang="de-DE" dirty="0" smtClean="0"/>
+              <a:t>: </a:t>
+            </a:r>
+            <a:r>
+              <a:rPr lang="de-DE" dirty="0" err="1" smtClean="0"/>
+              <a:t>develop</a:t>
+            </a:r>
+            <a:endParaRPr lang="de-DE" dirty="0"/>
           </a:p>
         </p:txBody>
       </p:sp>

</xml_diff>